<commit_message>
changed ideation docs, revamping project
</commit_message>
<xml_diff>
--- a/ideation_docs/01-iphone-wireframe-template.pptx
+++ b/ideation_docs/01-iphone-wireframe-template.pptx
@@ -213,7 +213,7 @@
           <a:p>
             <a:fld id="{79B88A7B-0B1A-4D17-B72A-7A7FB5F40518}" type="datetimeFigureOut">
               <a:rPr lang="en-US" smtClean="0"/>
-              <a:t>12/4/21</a:t>
+              <a:t>12/29/21</a:t>
             </a:fld>
             <a:endParaRPr lang="en-US"/>
           </a:p>
@@ -659,7 +659,7 @@
           <a:p>
             <a:fld id="{CB9E878C-2893-43F5-80FA-AA32212D425A}" type="datetimeFigureOut">
               <a:rPr lang="en-US" smtClean="0"/>
-              <a:t>12/4/21</a:t>
+              <a:t>12/29/21</a:t>
             </a:fld>
             <a:endParaRPr lang="en-US"/>
           </a:p>
@@ -827,7 +827,7 @@
           <a:p>
             <a:fld id="{CB9E878C-2893-43F5-80FA-AA32212D425A}" type="datetimeFigureOut">
               <a:rPr lang="en-US" smtClean="0"/>
-              <a:t>12/4/21</a:t>
+              <a:t>12/29/21</a:t>
             </a:fld>
             <a:endParaRPr lang="en-US"/>
           </a:p>
@@ -1005,7 +1005,7 @@
           <a:p>
             <a:fld id="{CB9E878C-2893-43F5-80FA-AA32212D425A}" type="datetimeFigureOut">
               <a:rPr lang="en-US" smtClean="0"/>
-              <a:t>12/4/21</a:t>
+              <a:t>12/29/21</a:t>
             </a:fld>
             <a:endParaRPr lang="en-US"/>
           </a:p>
@@ -1173,7 +1173,7 @@
           <a:p>
             <a:fld id="{CB9E878C-2893-43F5-80FA-AA32212D425A}" type="datetimeFigureOut">
               <a:rPr lang="en-US" smtClean="0"/>
-              <a:t>12/4/21</a:t>
+              <a:t>12/29/21</a:t>
             </a:fld>
             <a:endParaRPr lang="en-US"/>
           </a:p>
@@ -1418,7 +1418,7 @@
           <a:p>
             <a:fld id="{CB9E878C-2893-43F5-80FA-AA32212D425A}" type="datetimeFigureOut">
               <a:rPr lang="en-US" smtClean="0"/>
-              <a:t>12/4/21</a:t>
+              <a:t>12/29/21</a:t>
             </a:fld>
             <a:endParaRPr lang="en-US"/>
           </a:p>
@@ -1703,7 +1703,7 @@
           <a:p>
             <a:fld id="{CB9E878C-2893-43F5-80FA-AA32212D425A}" type="datetimeFigureOut">
               <a:rPr lang="en-US" smtClean="0"/>
-              <a:t>12/4/21</a:t>
+              <a:t>12/29/21</a:t>
             </a:fld>
             <a:endParaRPr lang="en-US"/>
           </a:p>
@@ -2122,7 +2122,7 @@
           <a:p>
             <a:fld id="{CB9E878C-2893-43F5-80FA-AA32212D425A}" type="datetimeFigureOut">
               <a:rPr lang="en-US" smtClean="0"/>
-              <a:t>12/4/21</a:t>
+              <a:t>12/29/21</a:t>
             </a:fld>
             <a:endParaRPr lang="en-US"/>
           </a:p>
@@ -2239,7 +2239,7 @@
           <a:p>
             <a:fld id="{CB9E878C-2893-43F5-80FA-AA32212D425A}" type="datetimeFigureOut">
               <a:rPr lang="en-US" smtClean="0"/>
-              <a:t>12/4/21</a:t>
+              <a:t>12/29/21</a:t>
             </a:fld>
             <a:endParaRPr lang="en-US"/>
           </a:p>
@@ -2334,7 +2334,7 @@
           <a:p>
             <a:fld id="{CB9E878C-2893-43F5-80FA-AA32212D425A}" type="datetimeFigureOut">
               <a:rPr lang="en-US" smtClean="0"/>
-              <a:t>12/4/21</a:t>
+              <a:t>12/29/21</a:t>
             </a:fld>
             <a:endParaRPr lang="en-US"/>
           </a:p>
@@ -2609,7 +2609,7 @@
           <a:p>
             <a:fld id="{CB9E878C-2893-43F5-80FA-AA32212D425A}" type="datetimeFigureOut">
               <a:rPr lang="en-US" smtClean="0"/>
-              <a:t>12/4/21</a:t>
+              <a:t>12/29/21</a:t>
             </a:fld>
             <a:endParaRPr lang="en-US"/>
           </a:p>
@@ -2861,7 +2861,7 @@
           <a:p>
             <a:fld id="{CB9E878C-2893-43F5-80FA-AA32212D425A}" type="datetimeFigureOut">
               <a:rPr lang="en-US" smtClean="0"/>
-              <a:t>12/4/21</a:t>
+              <a:t>12/29/21</a:t>
             </a:fld>
             <a:endParaRPr lang="en-US"/>
           </a:p>
@@ -3072,7 +3072,7 @@
           <a:p>
             <a:fld id="{CB9E878C-2893-43F5-80FA-AA32212D425A}" type="datetimeFigureOut">
               <a:rPr lang="en-US" smtClean="0"/>
-              <a:t>12/4/21</a:t>
+              <a:t>12/29/21</a:t>
             </a:fld>
             <a:endParaRPr lang="en-US"/>
           </a:p>
@@ -3462,134 +3462,6 @@
         <p:spPr>
           <a:xfrm>
             <a:off x="1925903" y="2858459"/>
-            <a:ext cx="2880765" cy="369332"/>
-          </a:xfrm>
-          <a:prstGeom prst="rect">
-            <a:avLst/>
-          </a:prstGeom>
-          <a:solidFill>
-            <a:schemeClr val="tx2">
-              <a:lumMod val="20000"/>
-              <a:lumOff val="80000"/>
-            </a:schemeClr>
-          </a:solidFill>
-        </p:spPr>
-        <p:txBody>
-          <a:bodyPr wrap="square" rtlCol="0">
-            <a:spAutoFit/>
-          </a:bodyPr>
-          <a:lstStyle/>
-          <a:p>
-            <a:r>
-              <a:rPr lang="en-US" b="1" dirty="0"/>
-              <a:t>Streaming Live Chart</a:t>
-            </a:r>
-          </a:p>
-        </p:txBody>
-      </p:sp>
-      <p:sp>
-        <p:nvSpPr>
-          <p:cNvPr id="15" name="TextBox 14">
-            <a:extLst>
-              <a:ext uri="{FF2B5EF4-FFF2-40B4-BE49-F238E27FC236}">
-                <a16:creationId xmlns:a16="http://schemas.microsoft.com/office/drawing/2014/main" id="{1635AD19-8CE9-A241-862B-CEC5A54D0D1D}"/>
-              </a:ext>
-            </a:extLst>
-          </p:cNvPr>
-          <p:cNvSpPr txBox="1"/>
-          <p:nvPr/>
-        </p:nvSpPr>
-        <p:spPr>
-          <a:xfrm>
-            <a:off x="4442527" y="4630145"/>
-            <a:ext cx="2880765" cy="646331"/>
-          </a:xfrm>
-          <a:prstGeom prst="rect">
-            <a:avLst/>
-          </a:prstGeom>
-          <a:solidFill>
-            <a:schemeClr val="tx2">
-              <a:lumMod val="20000"/>
-              <a:lumOff val="80000"/>
-            </a:schemeClr>
-          </a:solidFill>
-        </p:spPr>
-        <p:txBody>
-          <a:bodyPr wrap="square" rtlCol="0">
-            <a:spAutoFit/>
-          </a:bodyPr>
-          <a:lstStyle/>
-          <a:p>
-            <a:r>
-              <a:rPr lang="en-US" dirty="0"/>
-              <a:t>Create, Update, Retrieve and Delete </a:t>
-            </a:r>
-            <a:r>
-              <a:rPr lang="en-US" b="1" dirty="0"/>
-              <a:t>Trading Alerts</a:t>
-            </a:r>
-          </a:p>
-        </p:txBody>
-      </p:sp>
-      <p:sp>
-        <p:nvSpPr>
-          <p:cNvPr id="16" name="TextBox 15">
-            <a:extLst>
-              <a:ext uri="{FF2B5EF4-FFF2-40B4-BE49-F238E27FC236}">
-                <a16:creationId xmlns:a16="http://schemas.microsoft.com/office/drawing/2014/main" id="{57C5C8AB-8ACC-FF48-B742-9405FD9622F8}"/>
-              </a:ext>
-            </a:extLst>
-          </p:cNvPr>
-          <p:cNvSpPr txBox="1"/>
-          <p:nvPr/>
-        </p:nvSpPr>
-        <p:spPr>
-          <a:xfrm>
-            <a:off x="946764" y="3660603"/>
-            <a:ext cx="2880765" cy="369332"/>
-          </a:xfrm>
-          <a:prstGeom prst="rect">
-            <a:avLst/>
-          </a:prstGeom>
-          <a:solidFill>
-            <a:schemeClr val="tx2">
-              <a:lumMod val="20000"/>
-              <a:lumOff val="80000"/>
-            </a:schemeClr>
-          </a:solidFill>
-        </p:spPr>
-        <p:txBody>
-          <a:bodyPr wrap="square" rtlCol="0">
-            <a:spAutoFit/>
-          </a:bodyPr>
-          <a:lstStyle/>
-          <a:p>
-            <a:r>
-              <a:rPr lang="en-US" dirty="0"/>
-              <a:t>Retrieve/View </a:t>
-            </a:r>
-            <a:r>
-              <a:rPr lang="en-US" b="1" dirty="0"/>
-              <a:t>Tick Data</a:t>
-            </a:r>
-          </a:p>
-        </p:txBody>
-      </p:sp>
-      <p:sp>
-        <p:nvSpPr>
-          <p:cNvPr id="17" name="TextBox 16">
-            <a:extLst>
-              <a:ext uri="{FF2B5EF4-FFF2-40B4-BE49-F238E27FC236}">
-                <a16:creationId xmlns:a16="http://schemas.microsoft.com/office/drawing/2014/main" id="{D2EB676B-C5A9-EF45-920D-03A3ABB9B9FA}"/>
-              </a:ext>
-            </a:extLst>
-          </p:cNvPr>
-          <p:cNvSpPr txBox="1"/>
-          <p:nvPr/>
-        </p:nvSpPr>
-        <p:spPr>
-          <a:xfrm>
-            <a:off x="946764" y="4099801"/>
             <a:ext cx="2880765" cy="923330"/>
           </a:xfrm>
           <a:prstGeom prst="rect">
@@ -3609,22 +3481,26 @@
           <a:lstStyle/>
           <a:p>
             <a:r>
-              <a:rPr lang="en-US" dirty="0"/>
-              <a:t>Retrieve/View 30-min Interval </a:t>
-            </a:r>
-            <a:r>
               <a:rPr lang="en-US" b="1" dirty="0"/>
-              <a:t>Bollinger Bands Data</a:t>
+              <a:t>Choose </a:t>
+            </a:r>
+            <a:r>
+              <a:rPr lang="en-US" b="1" dirty="0" err="1"/>
+              <a:t>Backtests</a:t>
+            </a:r>
+            <a:r>
+              <a:rPr lang="en-US" b="1" dirty="0"/>
+              <a:t>: all instruments OR custom triplets</a:t>
             </a:r>
           </a:p>
         </p:txBody>
       </p:sp>
       <p:sp>
         <p:nvSpPr>
-          <p:cNvPr id="18" name="TextBox 17">
+          <p:cNvPr id="15" name="TextBox 14">
             <a:extLst>
               <a:ext uri="{FF2B5EF4-FFF2-40B4-BE49-F238E27FC236}">
-                <a16:creationId xmlns:a16="http://schemas.microsoft.com/office/drawing/2014/main" id="{26A39D3E-8A43-5F4F-9F27-CD68AAC5E514}"/>
+                <a16:creationId xmlns:a16="http://schemas.microsoft.com/office/drawing/2014/main" id="{1635AD19-8CE9-A241-862B-CEC5A54D0D1D}"/>
               </a:ext>
             </a:extLst>
           </p:cNvPr>
@@ -3633,8 +3509,8 @@
         </p:nvSpPr>
         <p:spPr>
           <a:xfrm>
-            <a:off x="946765" y="5085844"/>
-            <a:ext cx="2880765" cy="646331"/>
+            <a:off x="4442527" y="4630145"/>
+            <a:ext cx="2880765" cy="923330"/>
           </a:xfrm>
           <a:prstGeom prst="rect">
             <a:avLst/>
@@ -3654,21 +3530,21 @@
           <a:p>
             <a:r>
               <a:rPr lang="en-US" dirty="0"/>
-              <a:t>Retrieve/View </a:t>
+              <a:t>Create, Update, Retrieve and Delete </a:t>
             </a:r>
             <a:r>
               <a:rPr lang="en-US" b="1" dirty="0"/>
-              <a:t>Current Positions</a:t>
+              <a:t>starting balance and PNL</a:t>
             </a:r>
           </a:p>
         </p:txBody>
       </p:sp>
       <p:sp>
         <p:nvSpPr>
-          <p:cNvPr id="19" name="TextBox 18">
+          <p:cNvPr id="17" name="TextBox 16">
             <a:extLst>
               <a:ext uri="{FF2B5EF4-FFF2-40B4-BE49-F238E27FC236}">
-                <a16:creationId xmlns:a16="http://schemas.microsoft.com/office/drawing/2014/main" id="{B56BB65D-8A85-6B43-9970-E46DDB2B2319}"/>
+                <a16:creationId xmlns:a16="http://schemas.microsoft.com/office/drawing/2014/main" id="{D2EB676B-C5A9-EF45-920D-03A3ABB9B9FA}"/>
               </a:ext>
             </a:extLst>
           </p:cNvPr>
@@ -3677,8 +3553,8 @@
         </p:nvSpPr>
         <p:spPr>
           <a:xfrm>
-            <a:off x="946765" y="5813658"/>
-            <a:ext cx="2880765" cy="646331"/>
+            <a:off x="946764" y="4099801"/>
+            <a:ext cx="2880765" cy="1200329"/>
           </a:xfrm>
           <a:prstGeom prst="rect">
             <a:avLst/>
@@ -3701,12 +3577,20 @@
               <a:t>Retrieve/View </a:t>
             </a:r>
             <a:r>
-              <a:rPr lang="en-US" b="1" dirty="0"/>
-              <a:t>Trading History + </a:t>
-            </a:r>
-            <a:r>
-              <a:rPr lang="en-US" b="1" dirty="0" err="1"/>
-              <a:t>PnL</a:t>
+              <a:rPr lang="en-US" dirty="0" err="1"/>
+              <a:t>backtest</a:t>
+            </a:r>
+            <a:r>
+              <a:rPr lang="en-US" dirty="0"/>
+              <a:t> data: ROI, net ROI, commissions, half-life, start date, end date and </a:t>
+            </a:r>
+            <a:r>
+              <a:rPr lang="en-US" dirty="0" err="1"/>
+              <a:t>backtest</a:t>
+            </a:r>
+            <a:r>
+              <a:rPr lang="en-US" dirty="0"/>
+              <a:t> created date</a:t>
             </a:r>
             <a:endParaRPr lang="en-US" b="1" dirty="0"/>
           </a:p>
@@ -3727,7 +3611,7 @@
         <p:spPr>
           <a:xfrm>
             <a:off x="6116227" y="3632439"/>
-            <a:ext cx="2880765" cy="646331"/>
+            <a:ext cx="2880765" cy="923330"/>
           </a:xfrm>
           <a:prstGeom prst="rect">
             <a:avLst/>
@@ -3747,12 +3631,13 @@
           <a:p>
             <a:r>
               <a:rPr lang="en-US" b="1" dirty="0"/>
-              <a:t>Email/Telegram Sent </a:t>
-            </a:r>
-            <a:r>
-              <a:rPr lang="en-US" dirty="0"/>
-              <a:t>when Trading Alert Levels hit</a:t>
-            </a:r>
+              <a:t>ROI Charts for each instrument triplets </a:t>
+            </a:r>
+            <a:r>
+              <a:rPr lang="en-US" b="1" dirty="0" err="1"/>
+              <a:t>backtested</a:t>
+            </a:r>
+            <a:endParaRPr lang="en-US" dirty="0"/>
           </a:p>
         </p:txBody>
       </p:sp>
@@ -3793,51 +3678,6 @@
               <a:rPr lang="en-US" dirty="0"/>
               <a:t>Homepage – General Info, Signup and Login</a:t>
             </a:r>
-          </a:p>
-        </p:txBody>
-      </p:sp>
-      <p:sp>
-        <p:nvSpPr>
-          <p:cNvPr id="22" name="TextBox 21">
-            <a:extLst>
-              <a:ext uri="{FF2B5EF4-FFF2-40B4-BE49-F238E27FC236}">
-                <a16:creationId xmlns:a16="http://schemas.microsoft.com/office/drawing/2014/main" id="{36071D82-1A21-C143-A3BF-EA4DEBD410D6}"/>
-              </a:ext>
-            </a:extLst>
-          </p:cNvPr>
-          <p:cNvSpPr txBox="1"/>
-          <p:nvPr/>
-        </p:nvSpPr>
-        <p:spPr>
-          <a:xfrm>
-            <a:off x="4442527" y="5443185"/>
-            <a:ext cx="2880765" cy="369332"/>
-          </a:xfrm>
-          <a:prstGeom prst="rect">
-            <a:avLst/>
-          </a:prstGeom>
-          <a:solidFill>
-            <a:schemeClr val="tx2">
-              <a:lumMod val="20000"/>
-              <a:lumOff val="80000"/>
-            </a:schemeClr>
-          </a:solidFill>
-        </p:spPr>
-        <p:txBody>
-          <a:bodyPr wrap="square" rtlCol="0">
-            <a:spAutoFit/>
-          </a:bodyPr>
-          <a:lstStyle/>
-          <a:p>
-            <a:r>
-              <a:rPr lang="en-US" b="1" dirty="0"/>
-              <a:t>Bot </a:t>
-            </a:r>
-            <a:r>
-              <a:rPr lang="en-US" b="1" dirty="0" err="1"/>
-              <a:t>Killswitch</a:t>
-            </a:r>
-            <a:endParaRPr lang="en-US" b="1" dirty="0"/>
           </a:p>
         </p:txBody>
       </p:sp>
@@ -3894,7 +3734,7 @@
         </p:nvCxnSpPr>
         <p:spPr>
           <a:xfrm flipH="1">
-            <a:off x="2620470" y="3345269"/>
+            <a:off x="2253627" y="3765840"/>
             <a:ext cx="267038" cy="226577"/>
           </a:xfrm>
           <a:prstGeom prst="straightConnector1">
@@ -3937,48 +3777,6 @@
           <a:xfrm>
             <a:off x="3989372" y="5085844"/>
             <a:ext cx="315590" cy="0"/>
-          </a:xfrm>
-          <a:prstGeom prst="straightConnector1">
-            <a:avLst/>
-          </a:prstGeom>
-          <a:ln>
-            <a:tailEnd type="triangle"/>
-          </a:ln>
-        </p:spPr>
-        <p:style>
-          <a:lnRef idx="1">
-            <a:schemeClr val="dk1"/>
-          </a:lnRef>
-          <a:fillRef idx="0">
-            <a:schemeClr val="dk1"/>
-          </a:fillRef>
-          <a:effectRef idx="0">
-            <a:schemeClr val="dk1"/>
-          </a:effectRef>
-          <a:fontRef idx="minor">
-            <a:schemeClr val="tx1"/>
-          </a:fontRef>
-        </p:style>
-      </p:cxnSp>
-      <p:cxnSp>
-        <p:nvCxnSpPr>
-          <p:cNvPr id="32" name="Straight Arrow Connector 31">
-            <a:extLst>
-              <a:ext uri="{FF2B5EF4-FFF2-40B4-BE49-F238E27FC236}">
-                <a16:creationId xmlns:a16="http://schemas.microsoft.com/office/drawing/2014/main" id="{CF5D3539-AC91-1F41-8E35-AFB4D8D70071}"/>
-              </a:ext>
-            </a:extLst>
-          </p:cNvPr>
-          <p:cNvCxnSpPr>
-            <a:cxnSpLocks/>
-            <a:endCxn id="22" idx="1"/>
-          </p:cNvCxnSpPr>
-          <p:nvPr/>
-        </p:nvCxnSpPr>
-        <p:spPr>
-          <a:xfrm>
-            <a:off x="3975885" y="5197784"/>
-            <a:ext cx="466642" cy="430067"/>
           </a:xfrm>
           <a:prstGeom prst="straightConnector1">
             <a:avLst/>
@@ -4073,51 +3871,15 @@
           <a:p>
             <a:r>
               <a:rPr lang="en-US" sz="3000" dirty="0"/>
-              <a:t>Main Purpose: Monitoring Data from a Trading Bot</a:t>
-            </a:r>
-          </a:p>
-        </p:txBody>
-      </p:sp>
-      <p:sp>
-        <p:nvSpPr>
-          <p:cNvPr id="24" name="TextBox 23">
-            <a:extLst>
-              <a:ext uri="{FF2B5EF4-FFF2-40B4-BE49-F238E27FC236}">
-                <a16:creationId xmlns:a16="http://schemas.microsoft.com/office/drawing/2014/main" id="{8BE97286-B6C2-6141-A01A-54D62EF5DE67}"/>
-              </a:ext>
-            </a:extLst>
-          </p:cNvPr>
-          <p:cNvSpPr txBox="1"/>
-          <p:nvPr/>
-        </p:nvSpPr>
-        <p:spPr>
-          <a:xfrm>
-            <a:off x="5961390" y="1123352"/>
-            <a:ext cx="2880765" cy="923330"/>
-          </a:xfrm>
-          <a:prstGeom prst="rect">
-            <a:avLst/>
-          </a:prstGeom>
-          <a:solidFill>
-            <a:schemeClr val="tx2">
-              <a:lumMod val="20000"/>
-              <a:lumOff val="80000"/>
-            </a:schemeClr>
-          </a:solidFill>
-        </p:spPr>
-        <p:txBody>
-          <a:bodyPr wrap="square" rtlCol="0">
-            <a:spAutoFit/>
-          </a:bodyPr>
-          <a:lstStyle/>
-          <a:p>
-            <a:r>
-              <a:rPr lang="en-US" dirty="0"/>
-              <a:t>CK - Create, Update, Retrieve and Delete </a:t>
-            </a:r>
-            <a:r>
-              <a:rPr lang="en-US" b="1" dirty="0"/>
-              <a:t>Watchlist of Instruments</a:t>
+              <a:t>Main Purpose: Monitoring </a:t>
+            </a:r>
+            <a:r>
+              <a:rPr lang="en-US" sz="3000" dirty="0" err="1"/>
+              <a:t>Backtests</a:t>
+            </a:r>
+            <a:r>
+              <a:rPr lang="en-US" sz="3000" dirty="0"/>
+              <a:t> for a Trading Bot</a:t>
             </a:r>
           </a:p>
         </p:txBody>

</xml_diff>